<commit_message>
JuliaCon 2019 Presentation and demonstration.  Correction to overloading of division operator.
</commit_message>
<xml_diff>
--- a/Documents/JuliaCon 2019 Presentation.pptx
+++ b/Documents/JuliaCon 2019 Presentation.pptx
@@ -112,6 +112,11 @@
       </a:defRPr>
     </a:lvl9pPr>
   </p:defaultTextStyle>
+  <p:extLst>
+    <p:ext uri="{EFAFB233-063F-42B5-8137-9DF3F51BA10A}">
+      <p15:sldGuideLst xmlns:p15="http://schemas.microsoft.com/office/powerpoint/2012/main"/>
+    </p:ext>
+  </p:extLst>
 </p:presentation>
 </file>
 
@@ -301,7 +306,7 @@
           <a:p>
             <a:fld id="{4AAD347D-5ACD-4C99-B74B-A9C85AD731AF}" type="datetimeFigureOut">
               <a:rPr lang="en-US" dirty="0"/>
-              <a:t>7/1/2019</a:t>
+              <a:t>7/5/2019</a:t>
             </a:fld>
             <a:endParaRPr lang="en-US" dirty="0"/>
           </a:p>
@@ -571,7 +576,7 @@
           <a:p>
             <a:fld id="{4509A250-FF31-4206-8172-F9D3106AACB1}" type="datetimeFigureOut">
               <a:rPr lang="en-US" dirty="0"/>
-              <a:t>7/1/2019</a:t>
+              <a:t>7/5/2019</a:t>
             </a:fld>
             <a:endParaRPr lang="en-US" dirty="0"/>
           </a:p>
@@ -760,7 +765,7 @@
           <a:p>
             <a:fld id="{4509A250-FF31-4206-8172-F9D3106AACB1}" type="datetimeFigureOut">
               <a:rPr lang="en-US" dirty="0"/>
-              <a:t>7/1/2019</a:t>
+              <a:t>7/5/2019</a:t>
             </a:fld>
             <a:endParaRPr lang="en-US" dirty="0"/>
           </a:p>
@@ -1028,7 +1033,7 @@
           <a:p>
             <a:fld id="{4509A250-FF31-4206-8172-F9D3106AACB1}" type="datetimeFigureOut">
               <a:rPr lang="en-US" dirty="0"/>
-              <a:t>7/1/2019</a:t>
+              <a:t>7/5/2019</a:t>
             </a:fld>
             <a:endParaRPr lang="en-US" dirty="0"/>
           </a:p>
@@ -1364,7 +1369,7 @@
           <a:p>
             <a:fld id="{4509A250-FF31-4206-8172-F9D3106AACB1}" type="datetimeFigureOut">
               <a:rPr lang="en-US" dirty="0"/>
-              <a:t>7/1/2019</a:t>
+              <a:t>7/5/2019</a:t>
             </a:fld>
             <a:endParaRPr lang="en-US" dirty="0"/>
           </a:p>
@@ -1982,7 +1987,7 @@
           <a:p>
             <a:fld id="{4509A250-FF31-4206-8172-F9D3106AACB1}" type="datetimeFigureOut">
               <a:rPr lang="en-US" dirty="0"/>
-              <a:t>7/1/2019</a:t>
+              <a:t>7/5/2019</a:t>
             </a:fld>
             <a:endParaRPr lang="en-US" dirty="0"/>
           </a:p>
@@ -2837,7 +2842,7 @@
           <a:p>
             <a:fld id="{4509A250-FF31-4206-8172-F9D3106AACB1}" type="datetimeFigureOut">
               <a:rPr lang="en-US" dirty="0"/>
-              <a:t>7/1/2019</a:t>
+              <a:t>7/5/2019</a:t>
             </a:fld>
             <a:endParaRPr lang="en-US" dirty="0"/>
           </a:p>
@@ -3002,7 +3007,7 @@
           <a:p>
             <a:fld id="{4509A250-FF31-4206-8172-F9D3106AACB1}" type="datetimeFigureOut">
               <a:rPr lang="en-US" dirty="0"/>
-              <a:t>7/1/2019</a:t>
+              <a:t>7/5/2019</a:t>
             </a:fld>
             <a:endParaRPr lang="en-US" dirty="0"/>
           </a:p>
@@ -3177,7 +3182,7 @@
           <a:p>
             <a:fld id="{4509A250-FF31-4206-8172-F9D3106AACB1}" type="datetimeFigureOut">
               <a:rPr lang="en-US" dirty="0"/>
-              <a:t>7/1/2019</a:t>
+              <a:t>7/5/2019</a:t>
             </a:fld>
             <a:endParaRPr lang="en-US" dirty="0"/>
           </a:p>
@@ -3342,7 +3347,7 @@
           <a:p>
             <a:fld id="{4509A250-FF31-4206-8172-F9D3106AACB1}" type="datetimeFigureOut">
               <a:rPr lang="en-US" dirty="0"/>
-              <a:t>7/1/2019</a:t>
+              <a:t>7/5/2019</a:t>
             </a:fld>
             <a:endParaRPr lang="en-US" dirty="0"/>
           </a:p>
@@ -3584,7 +3589,7 @@
           <a:p>
             <a:fld id="{9796027F-7875-4030-9381-8BD8C4F21935}" type="datetimeFigureOut">
               <a:rPr lang="en-US" dirty="0"/>
-              <a:t>7/1/2019</a:t>
+              <a:t>7/5/2019</a:t>
             </a:fld>
             <a:endParaRPr lang="en-US" dirty="0"/>
           </a:p>
@@ -3871,7 +3876,7 @@
           <a:p>
             <a:fld id="{9796027F-7875-4030-9381-8BD8C4F21935}" type="datetimeFigureOut">
               <a:rPr lang="en-US" dirty="0"/>
-              <a:t>7/1/2019</a:t>
+              <a:t>7/5/2019</a:t>
             </a:fld>
             <a:endParaRPr lang="en-US" dirty="0"/>
           </a:p>
@@ -4310,7 +4315,7 @@
           <a:p>
             <a:fld id="{9796027F-7875-4030-9381-8BD8C4F21935}" type="datetimeFigureOut">
               <a:rPr lang="en-US" dirty="0"/>
-              <a:t>7/1/2019</a:t>
+              <a:t>7/5/2019</a:t>
             </a:fld>
             <a:endParaRPr lang="en-US" dirty="0"/>
           </a:p>
@@ -4423,7 +4428,7 @@
           <a:p>
             <a:fld id="{4509A250-FF31-4206-8172-F9D3106AACB1}" type="datetimeFigureOut">
               <a:rPr lang="en-US" dirty="0"/>
-              <a:t>7/1/2019</a:t>
+              <a:t>7/5/2019</a:t>
             </a:fld>
             <a:endParaRPr lang="en-US" dirty="0"/>
           </a:p>
@@ -4513,7 +4518,7 @@
           <a:p>
             <a:fld id="{4509A250-FF31-4206-8172-F9D3106AACB1}" type="datetimeFigureOut">
               <a:rPr lang="en-US" dirty="0"/>
-              <a:t>7/1/2019</a:t>
+              <a:t>7/5/2019</a:t>
             </a:fld>
             <a:endParaRPr lang="en-US" dirty="0"/>
           </a:p>
@@ -4787,7 +4792,7 @@
           <a:p>
             <a:fld id="{4509A250-FF31-4206-8172-F9D3106AACB1}" type="datetimeFigureOut">
               <a:rPr lang="en-US" dirty="0"/>
-              <a:t>7/1/2019</a:t>
+              <a:t>7/5/2019</a:t>
             </a:fld>
             <a:endParaRPr lang="en-US" dirty="0"/>
           </a:p>
@@ -5057,7 +5062,7 @@
           <a:p>
             <a:fld id="{4509A250-FF31-4206-8172-F9D3106AACB1}" type="datetimeFigureOut">
               <a:rPr lang="en-US" dirty="0"/>
-              <a:t>7/1/2019</a:t>
+              <a:t>7/5/2019</a:t>
             </a:fld>
             <a:endParaRPr lang="en-US" dirty="0"/>
           </a:p>
@@ -5481,7 +5486,7 @@
           <a:p>
             <a:fld id="{4AAD347D-5ACD-4C99-B74B-A9C85AD731AF}" type="datetimeFigureOut">
               <a:rPr lang="en-US" dirty="0"/>
-              <a:t>7/1/2019</a:t>
+              <a:t>7/5/2019</a:t>
             </a:fld>
             <a:endParaRPr lang="en-US" dirty="0"/>
           </a:p>
@@ -6804,6 +6809,18 @@
               <a:t>Most C code tests implemented using Julia test facility</a:t>
             </a:r>
           </a:p>
+          <a:p>
+            <a:pPr lvl="1"/>
+            <a:r>
+              <a:rPr lang="en-US" dirty="0"/>
+              <a:t>Implemented in v0.6, then upgraded using v0.7 to </a:t>
+            </a:r>
+            <a:r>
+              <a:rPr lang="en-US"/>
+              <a:t>ease upgrade to 1.0</a:t>
+            </a:r>
+            <a:endParaRPr lang="en-US" dirty="0"/>
+          </a:p>
         </p:txBody>
       </p:sp>
     </p:spTree>
@@ -6973,13 +6990,19 @@
           <a:p>
             <a:r>
               <a:rPr lang="en-US" dirty="0"/>
-              <a:t>Additional datetime arithmetic – e.g., addition of intervals to datetimes</a:t>
+              <a:t>Additional datetime arithmetic – e.g., addition of calendar unit intervals to datetimes, e.g., years, months, days, hours, minutes, etc.</a:t>
             </a:r>
           </a:p>
           <a:p>
             <a:r>
               <a:rPr lang="en-US" dirty="0"/>
               <a:t>“Business” datetime arithmetic – e.g., holiday schedules, end of month conventions, leap-year conventions</a:t>
+            </a:r>
+          </a:p>
+          <a:p>
+            <a:r>
+              <a:rPr lang="en-US" dirty="0"/>
+              <a:t>Local datetime ranges in calendar units</a:t>
             </a:r>
           </a:p>
           <a:p>

</xml_diff>